<commit_message>
Change it to light mode
</commit_message>
<xml_diff>
--- a/线性代数概论.pptx
+++ b/线性代数概论.pptx
@@ -2,7 +2,7 @@
 <file path=ppt/presentation.xml><?xml version="1.0" encoding="utf-8"?>
 <p:presentation xmlns:a="http://schemas.openxmlformats.org/drawingml/2006/main" xmlns:r="http://schemas.openxmlformats.org/officeDocument/2006/relationships" xmlns:p="http://schemas.openxmlformats.org/presentationml/2006/main" saveSubsetFonts="1">
   <p:sldMasterIdLst>
-    <p:sldMasterId id="2147483744" r:id="rId1"/>
+    <p:sldMasterId id="2147483756" r:id="rId1"/>
   </p:sldMasterIdLst>
   <p:notesMasterIdLst>
     <p:notesMasterId r:id="rId52"/>
@@ -246,7 +246,7 @@
           <a:p>
             <a:fld id="{72FE8D1F-DBB0-49AD-8E21-E12B822CBA06}" type="datetimeFigureOut">
               <a:rPr lang="zh-CN" altLang="en-US" smtClean="0"/>
-              <a:t>2022/11/5</a:t>
+              <a:t>2022/11/8</a:t>
             </a:fld>
             <a:endParaRPr lang="zh-CN" altLang="en-US"/>
           </a:p>
@@ -744,7 +744,7 @@
           <a:p>
             <a:fld id="{68C2EE51-D70C-47A2-84D2-32B7B87200BF}" type="datetimeFigureOut">
               <a:rPr lang="zh-CN" altLang="en-US" smtClean="0"/>
-              <a:t>2022/11/5</a:t>
+              <a:t>2022/11/8</a:t>
             </a:fld>
             <a:endParaRPr lang="zh-CN" altLang="en-US"/>
           </a:p>
@@ -795,7 +795,7 @@
     </p:spTree>
     <p:extLst>
       <p:ext uri="{BB962C8B-B14F-4D97-AF65-F5344CB8AC3E}">
-        <p14:creationId xmlns:p14="http://schemas.microsoft.com/office/powerpoint/2010/main" val="1832495908"/>
+        <p14:creationId xmlns:p14="http://schemas.microsoft.com/office/powerpoint/2010/main" val="839492684"/>
       </p:ext>
     </p:extLst>
   </p:cSld>
@@ -914,7 +914,7 @@
           <a:p>
             <a:fld id="{68C2EE51-D70C-47A2-84D2-32B7B87200BF}" type="datetimeFigureOut">
               <a:rPr lang="zh-CN" altLang="en-US" smtClean="0"/>
-              <a:t>2022/11/5</a:t>
+              <a:t>2022/11/8</a:t>
             </a:fld>
             <a:endParaRPr lang="zh-CN" altLang="en-US"/>
           </a:p>
@@ -965,7 +965,7 @@
     </p:spTree>
     <p:extLst>
       <p:ext uri="{BB962C8B-B14F-4D97-AF65-F5344CB8AC3E}">
-        <p14:creationId xmlns:p14="http://schemas.microsoft.com/office/powerpoint/2010/main" val="522218956"/>
+        <p14:creationId xmlns:p14="http://schemas.microsoft.com/office/powerpoint/2010/main" val="2384617086"/>
       </p:ext>
     </p:extLst>
   </p:cSld>
@@ -1094,7 +1094,7 @@
           <a:p>
             <a:fld id="{68C2EE51-D70C-47A2-84D2-32B7B87200BF}" type="datetimeFigureOut">
               <a:rPr lang="zh-CN" altLang="en-US" smtClean="0"/>
-              <a:t>2022/11/5</a:t>
+              <a:t>2022/11/8</a:t>
             </a:fld>
             <a:endParaRPr lang="zh-CN" altLang="en-US"/>
           </a:p>
@@ -1145,7 +1145,7 @@
     </p:spTree>
     <p:extLst>
       <p:ext uri="{BB962C8B-B14F-4D97-AF65-F5344CB8AC3E}">
-        <p14:creationId xmlns:p14="http://schemas.microsoft.com/office/powerpoint/2010/main" val="71993700"/>
+        <p14:creationId xmlns:p14="http://schemas.microsoft.com/office/powerpoint/2010/main" val="1237050372"/>
       </p:ext>
     </p:extLst>
   </p:cSld>
@@ -1264,7 +1264,7 @@
           <a:p>
             <a:fld id="{68C2EE51-D70C-47A2-84D2-32B7B87200BF}" type="datetimeFigureOut">
               <a:rPr lang="zh-CN" altLang="en-US" smtClean="0"/>
-              <a:t>2022/11/5</a:t>
+              <a:t>2022/11/8</a:t>
             </a:fld>
             <a:endParaRPr lang="zh-CN" altLang="en-US"/>
           </a:p>
@@ -1315,7 +1315,7 @@
     </p:spTree>
     <p:extLst>
       <p:ext uri="{BB962C8B-B14F-4D97-AF65-F5344CB8AC3E}">
-        <p14:creationId xmlns:p14="http://schemas.microsoft.com/office/powerpoint/2010/main" val="1632210184"/>
+        <p14:creationId xmlns:p14="http://schemas.microsoft.com/office/powerpoint/2010/main" val="2129047174"/>
       </p:ext>
     </p:extLst>
   </p:cSld>
@@ -1510,7 +1510,7 @@
           <a:p>
             <a:fld id="{68C2EE51-D70C-47A2-84D2-32B7B87200BF}" type="datetimeFigureOut">
               <a:rPr lang="zh-CN" altLang="en-US" smtClean="0"/>
-              <a:t>2022/11/5</a:t>
+              <a:t>2022/11/8</a:t>
             </a:fld>
             <a:endParaRPr lang="zh-CN" altLang="en-US"/>
           </a:p>
@@ -1561,7 +1561,7 @@
     </p:spTree>
     <p:extLst>
       <p:ext uri="{BB962C8B-B14F-4D97-AF65-F5344CB8AC3E}">
-        <p14:creationId xmlns:p14="http://schemas.microsoft.com/office/powerpoint/2010/main" val="1602973661"/>
+        <p14:creationId xmlns:p14="http://schemas.microsoft.com/office/powerpoint/2010/main" val="2429930942"/>
       </p:ext>
     </p:extLst>
   </p:cSld>
@@ -1742,7 +1742,7 @@
           <a:p>
             <a:fld id="{68C2EE51-D70C-47A2-84D2-32B7B87200BF}" type="datetimeFigureOut">
               <a:rPr lang="zh-CN" altLang="en-US" smtClean="0"/>
-              <a:t>2022/11/5</a:t>
+              <a:t>2022/11/8</a:t>
             </a:fld>
             <a:endParaRPr lang="zh-CN" altLang="en-US"/>
           </a:p>
@@ -1793,7 +1793,7 @@
     </p:spTree>
     <p:extLst>
       <p:ext uri="{BB962C8B-B14F-4D97-AF65-F5344CB8AC3E}">
-        <p14:creationId xmlns:p14="http://schemas.microsoft.com/office/powerpoint/2010/main" val="951363661"/>
+        <p14:creationId xmlns:p14="http://schemas.microsoft.com/office/powerpoint/2010/main" val="231323435"/>
       </p:ext>
     </p:extLst>
   </p:cSld>
@@ -2109,7 +2109,7 @@
           <a:p>
             <a:fld id="{68C2EE51-D70C-47A2-84D2-32B7B87200BF}" type="datetimeFigureOut">
               <a:rPr lang="zh-CN" altLang="en-US" smtClean="0"/>
-              <a:t>2022/11/5</a:t>
+              <a:t>2022/11/8</a:t>
             </a:fld>
             <a:endParaRPr lang="zh-CN" altLang="en-US"/>
           </a:p>
@@ -2160,7 +2160,7 @@
     </p:spTree>
     <p:extLst>
       <p:ext uri="{BB962C8B-B14F-4D97-AF65-F5344CB8AC3E}">
-        <p14:creationId xmlns:p14="http://schemas.microsoft.com/office/powerpoint/2010/main" val="1889789698"/>
+        <p14:creationId xmlns:p14="http://schemas.microsoft.com/office/powerpoint/2010/main" val="4001798690"/>
       </p:ext>
     </p:extLst>
   </p:cSld>
@@ -2227,7 +2227,7 @@
           <a:p>
             <a:fld id="{68C2EE51-D70C-47A2-84D2-32B7B87200BF}" type="datetimeFigureOut">
               <a:rPr lang="zh-CN" altLang="en-US" smtClean="0"/>
-              <a:t>2022/11/5</a:t>
+              <a:t>2022/11/8</a:t>
             </a:fld>
             <a:endParaRPr lang="zh-CN" altLang="en-US"/>
           </a:p>
@@ -2278,7 +2278,7 @@
     </p:spTree>
     <p:extLst>
       <p:ext uri="{BB962C8B-B14F-4D97-AF65-F5344CB8AC3E}">
-        <p14:creationId xmlns:p14="http://schemas.microsoft.com/office/powerpoint/2010/main" val="71843234"/>
+        <p14:creationId xmlns:p14="http://schemas.microsoft.com/office/powerpoint/2010/main" val="875629098"/>
       </p:ext>
     </p:extLst>
   </p:cSld>
@@ -2322,7 +2322,7 @@
           <a:p>
             <a:fld id="{68C2EE51-D70C-47A2-84D2-32B7B87200BF}" type="datetimeFigureOut">
               <a:rPr lang="zh-CN" altLang="en-US" smtClean="0"/>
-              <a:t>2022/11/5</a:t>
+              <a:t>2022/11/8</a:t>
             </a:fld>
             <a:endParaRPr lang="zh-CN" altLang="en-US"/>
           </a:p>
@@ -2373,7 +2373,7 @@
     </p:spTree>
     <p:extLst>
       <p:ext uri="{BB962C8B-B14F-4D97-AF65-F5344CB8AC3E}">
-        <p14:creationId xmlns:p14="http://schemas.microsoft.com/office/powerpoint/2010/main" val="34173059"/>
+        <p14:creationId xmlns:p14="http://schemas.microsoft.com/office/powerpoint/2010/main" val="2389459264"/>
       </p:ext>
     </p:extLst>
   </p:cSld>
@@ -2599,7 +2599,7 @@
           <a:p>
             <a:fld id="{68C2EE51-D70C-47A2-84D2-32B7B87200BF}" type="datetimeFigureOut">
               <a:rPr lang="zh-CN" altLang="en-US" smtClean="0"/>
-              <a:t>2022/11/5</a:t>
+              <a:t>2022/11/8</a:t>
             </a:fld>
             <a:endParaRPr lang="zh-CN" altLang="en-US"/>
           </a:p>
@@ -2650,7 +2650,7 @@
     </p:spTree>
     <p:extLst>
       <p:ext uri="{BB962C8B-B14F-4D97-AF65-F5344CB8AC3E}">
-        <p14:creationId xmlns:p14="http://schemas.microsoft.com/office/powerpoint/2010/main" val="849185874"/>
+        <p14:creationId xmlns:p14="http://schemas.microsoft.com/office/powerpoint/2010/main" val="599287998"/>
       </p:ext>
     </p:extLst>
   </p:cSld>
@@ -2856,7 +2856,7 @@
           <a:p>
             <a:fld id="{68C2EE51-D70C-47A2-84D2-32B7B87200BF}" type="datetimeFigureOut">
               <a:rPr lang="zh-CN" altLang="en-US" smtClean="0"/>
-              <a:t>2022/11/5</a:t>
+              <a:t>2022/11/8</a:t>
             </a:fld>
             <a:endParaRPr lang="zh-CN" altLang="en-US"/>
           </a:p>
@@ -2907,7 +2907,7 @@
     </p:spTree>
     <p:extLst>
       <p:ext uri="{BB962C8B-B14F-4D97-AF65-F5344CB8AC3E}">
-        <p14:creationId xmlns:p14="http://schemas.microsoft.com/office/powerpoint/2010/main" val="3061814642"/>
+        <p14:creationId xmlns:p14="http://schemas.microsoft.com/office/powerpoint/2010/main" val="383278025"/>
       </p:ext>
     </p:extLst>
   </p:cSld>
@@ -3069,7 +3069,7 @@
           <a:p>
             <a:fld id="{68C2EE51-D70C-47A2-84D2-32B7B87200BF}" type="datetimeFigureOut">
               <a:rPr lang="zh-CN" altLang="en-US" smtClean="0"/>
-              <a:t>2022/11/5</a:t>
+              <a:t>2022/11/8</a:t>
             </a:fld>
             <a:endParaRPr lang="zh-CN" altLang="en-US"/>
           </a:p>
@@ -3156,23 +3156,23 @@
     </p:spTree>
     <p:extLst>
       <p:ext uri="{BB962C8B-B14F-4D97-AF65-F5344CB8AC3E}">
-        <p14:creationId xmlns:p14="http://schemas.microsoft.com/office/powerpoint/2010/main" val="438797509"/>
+        <p14:creationId xmlns:p14="http://schemas.microsoft.com/office/powerpoint/2010/main" val="891103778"/>
       </p:ext>
     </p:extLst>
   </p:cSld>
-  <p:clrMap bg1="dk1" tx1="lt1" bg2="dk2" tx2="lt2" accent1="accent1" accent2="accent2" accent3="accent3" accent4="accent4" accent5="accent5" accent6="accent6" hlink="hlink" folHlink="folHlink"/>
+  <p:clrMap bg1="lt1" tx1="dk1" bg2="lt2" tx2="dk2" accent1="accent1" accent2="accent2" accent3="accent3" accent4="accent4" accent5="accent5" accent6="accent6" hlink="hlink" folHlink="folHlink"/>
   <p:sldLayoutIdLst>
-    <p:sldLayoutId id="2147483745" r:id="rId1"/>
-    <p:sldLayoutId id="2147483746" r:id="rId2"/>
-    <p:sldLayoutId id="2147483747" r:id="rId3"/>
-    <p:sldLayoutId id="2147483748" r:id="rId4"/>
-    <p:sldLayoutId id="2147483749" r:id="rId5"/>
-    <p:sldLayoutId id="2147483750" r:id="rId6"/>
-    <p:sldLayoutId id="2147483751" r:id="rId7"/>
-    <p:sldLayoutId id="2147483752" r:id="rId8"/>
-    <p:sldLayoutId id="2147483753" r:id="rId9"/>
-    <p:sldLayoutId id="2147483754" r:id="rId10"/>
-    <p:sldLayoutId id="2147483755" r:id="rId11"/>
+    <p:sldLayoutId id="2147483757" r:id="rId1"/>
+    <p:sldLayoutId id="2147483758" r:id="rId2"/>
+    <p:sldLayoutId id="2147483759" r:id="rId3"/>
+    <p:sldLayoutId id="2147483760" r:id="rId4"/>
+    <p:sldLayoutId id="2147483761" r:id="rId5"/>
+    <p:sldLayoutId id="2147483762" r:id="rId6"/>
+    <p:sldLayoutId id="2147483763" r:id="rId7"/>
+    <p:sldLayoutId id="2147483764" r:id="rId8"/>
+    <p:sldLayoutId id="2147483765" r:id="rId9"/>
+    <p:sldLayoutId id="2147483766" r:id="rId10"/>
+    <p:sldLayoutId id="2147483767" r:id="rId11"/>
   </p:sldLayoutIdLst>
   <p:txStyles>
     <p:titleStyle>
@@ -30206,8 +30206,8 @@
           </a:p>
         </p:txBody>
       </p:sp>
-      <mc:AlternateContent xmlns:mc="http://schemas.openxmlformats.org/markup-compatibility/2006">
-        <mc:Choice xmlns:a14="http://schemas.microsoft.com/office/drawing/2010/main" Requires="a14">
+      <mc:AlternateContent xmlns:mc="http://schemas.openxmlformats.org/markup-compatibility/2006" xmlns:a14="http://schemas.microsoft.com/office/drawing/2010/main">
+        <mc:Choice Requires="a14">
           <p:sp>
             <p:nvSpPr>
               <p:cNvPr id="3" name="内容占位符 2">
@@ -30337,7 +30337,7 @@
             </p:txBody>
           </p:sp>
         </mc:Choice>
-        <mc:Fallback>
+        <mc:Fallback xmlns="">
           <p:sp>
             <p:nvSpPr>
               <p:cNvPr id="3" name="内容占位符 2">
@@ -30443,8 +30443,8 @@
           </a:p>
         </p:txBody>
       </p:sp>
-      <mc:AlternateContent xmlns:mc="http://schemas.openxmlformats.org/markup-compatibility/2006">
-        <mc:Choice xmlns:a14="http://schemas.microsoft.com/office/drawing/2010/main" Requires="a14">
+      <mc:AlternateContent xmlns:mc="http://schemas.openxmlformats.org/markup-compatibility/2006" xmlns:a14="http://schemas.microsoft.com/office/drawing/2010/main">
+        <mc:Choice Requires="a14">
           <p:sp>
             <p:nvSpPr>
               <p:cNvPr id="3" name="内容占位符 2">
@@ -30714,7 +30714,7 @@
             </p:txBody>
           </p:sp>
         </mc:Choice>
-        <mc:Fallback>
+        <mc:Fallback xmlns="">
           <p:sp>
             <p:nvSpPr>
               <p:cNvPr id="3" name="内容占位符 2">
@@ -30812,8 +30812,8 @@
           </a:p>
         </p:txBody>
       </p:sp>
-      <mc:AlternateContent xmlns:mc="http://schemas.openxmlformats.org/markup-compatibility/2006">
-        <mc:Choice xmlns:a14="http://schemas.microsoft.com/office/drawing/2010/main" Requires="a14">
+      <mc:AlternateContent xmlns:mc="http://schemas.openxmlformats.org/markup-compatibility/2006" xmlns:a14="http://schemas.microsoft.com/office/drawing/2010/main">
+        <mc:Choice Requires="a14">
           <p:sp>
             <p:nvSpPr>
               <p:cNvPr id="3" name="内容占位符 2">
@@ -30887,7 +30887,7 @@
             </p:txBody>
           </p:sp>
         </mc:Choice>
-        <mc:Fallback>
+        <mc:Fallback xmlns="">
           <p:sp>
             <p:nvSpPr>
               <p:cNvPr id="3" name="内容占位符 2">
@@ -31874,8 +31874,8 @@
           </a:p>
         </p:txBody>
       </p:sp>
-      <mc:AlternateContent xmlns:mc="http://schemas.openxmlformats.org/markup-compatibility/2006">
-        <mc:Choice xmlns:a14="http://schemas.microsoft.com/office/drawing/2010/main" Requires="a14">
+      <mc:AlternateContent xmlns:mc="http://schemas.openxmlformats.org/markup-compatibility/2006" xmlns:a14="http://schemas.microsoft.com/office/drawing/2010/main">
+        <mc:Choice Requires="a14">
           <p:sp>
             <p:nvSpPr>
               <p:cNvPr id="3" name="内容占位符 2">
@@ -31946,7 +31946,7 @@
             </p:txBody>
           </p:sp>
         </mc:Choice>
-        <mc:Fallback>
+        <mc:Fallback xmlns="">
           <p:sp>
             <p:nvSpPr>
               <p:cNvPr id="3" name="内容占位符 2">
@@ -34099,22 +34099,22 @@
         <a:srgbClr val="E7E6E6"/>
       </a:lt2>
       <a:accent1>
-        <a:srgbClr val="29AF8C"/>
+        <a:srgbClr val="4472C4"/>
       </a:accent1>
       <a:accent2>
-        <a:srgbClr val="97BE49"/>
+        <a:srgbClr val="ED7D31"/>
       </a:accent2>
       <a:accent3>
-        <a:srgbClr val="3D9CCC"/>
+        <a:srgbClr val="A5A5A5"/>
       </a:accent3>
       <a:accent4>
-        <a:srgbClr val="7C60C6"/>
+        <a:srgbClr val="FFC000"/>
       </a:accent4>
       <a:accent5>
-        <a:srgbClr val="C9492C"/>
+        <a:srgbClr val="5B9BD5"/>
       </a:accent5>
       <a:accent6>
-        <a:srgbClr val="D58C2E"/>
+        <a:srgbClr val="70AD47"/>
       </a:accent6>
       <a:hlink>
         <a:srgbClr val="0563C1"/>
@@ -34337,7 +34337,7 @@
   <a:extraClrSchemeLst/>
   <a:extLst>
     <a:ext uri="{05A4C25C-085E-4340-85A3-A5531E510DB2}">
-      <thm15:themeFamily xmlns:thm15="http://schemas.microsoft.com/office/thememl/2012/main" name="Office Theme" id="{62F939B6-93AF-4DB8-9C6B-D6C7DFDC589F}" vid="{3E4F19A7-A959-40BB-972C-4880BAF8EB09}"/>
+      <thm15:themeFamily xmlns:thm15="http://schemas.microsoft.com/office/thememl/2012/main" name="Office Theme" id="{62F939B6-93AF-4DB8-9C6B-D6C7DFDC589F}" vid="{4A3C46E8-61CC-4603-A589-7422A47A8E4A}"/>
     </a:ext>
   </a:extLst>
 </a:theme>

</xml_diff>